<commit_message>
unit testing presentation, small fixes
</commit_message>
<xml_diff>
--- a/03.PŁ.ZaawansowaneZagadnieniaProgramowaniawJavie.TestowanieJednostkowe.pptx
+++ b/03.PŁ.ZaawansowaneZagadnieniaProgramowaniawJavie.TestowanieJednostkowe.pptx
@@ -4792,6 +4792,42 @@
           </a:extLst>
         </p:spPr>
       </p:pic>
+      <p:sp>
+        <p:nvSpPr>
+          <p:cNvPr id="3" name="pole tekstowe 2"/>
+          <p:cNvSpPr txBox="1"/>
+          <p:nvPr/>
+        </p:nvSpPr>
+        <p:spPr>
+          <a:xfrm>
+            <a:off x="1184564" y="1901536"/>
+            <a:ext cx="2202872" cy="400110"/>
+          </a:xfrm>
+          <a:prstGeom prst="rect">
+            <a:avLst/>
+          </a:prstGeom>
+          <a:solidFill>
+            <a:schemeClr val="bg1"/>
+          </a:solidFill>
+        </p:spPr>
+        <p:txBody>
+          <a:bodyPr wrap="square" rtlCol="0">
+            <a:spAutoFit/>
+          </a:bodyPr>
+          <a:lstStyle/>
+          <a:p>
+            <a:r>
+              <a:rPr lang="pl-PL" dirty="0" smtClean="0"/>
+              <a:t>@</a:t>
+            </a:r>
+            <a:r>
+              <a:rPr lang="pl-PL" sz="2000" dirty="0" err="1" smtClean="0"/>
+              <a:t>RunWith</a:t>
+            </a:r>
+            <a:endParaRPr lang="en-US" dirty="0"/>
+          </a:p>
+        </p:txBody>
+      </p:sp>
     </p:spTree>
     <p:extLst>
       <p:ext uri="{BB962C8B-B14F-4D97-AF65-F5344CB8AC3E}">

</xml_diff>